<commit_message>
Update "Staerken und Grenzen" Folie
</commit_message>
<xml_diff>
--- a/2.Vortrag/Markov-Analyse_Präsentation.pptx
+++ b/2.Vortrag/Markov-Analyse_Präsentation.pptx
@@ -10189,8 +10189,8 @@
           </a:p>
         </p:txBody>
       </p:sp>
-      <mc:AlternateContent xmlns:mc="http://schemas.openxmlformats.org/markup-compatibility/2006">
-        <mc:Choice xmlns:a14="http://schemas.microsoft.com/office/drawing/2010/main" Requires="a14">
+      <mc:AlternateContent xmlns:mc="http://schemas.openxmlformats.org/markup-compatibility/2006" xmlns:a14="http://schemas.microsoft.com/office/drawing/2010/main">
+        <mc:Choice Requires="a14">
           <p:sp>
             <p:nvSpPr>
               <p:cNvPr id="2" name="Inhaltsplatzhalter 2">
@@ -10496,7 +10496,7 @@
             </p:txBody>
           </p:sp>
         </mc:Choice>
-        <mc:Fallback>
+        <mc:Fallback xmlns="">
           <p:sp>
             <p:nvSpPr>
               <p:cNvPr id="2" name="Inhaltsplatzhalter 2">
@@ -10723,8 +10723,8 @@
           </a:p>
         </p:txBody>
       </p:sp>
-      <mc:AlternateContent xmlns:mc="http://schemas.openxmlformats.org/markup-compatibility/2006">
-        <mc:Choice xmlns:a14="http://schemas.microsoft.com/office/drawing/2010/main" Requires="a14">
+      <mc:AlternateContent xmlns:mc="http://schemas.openxmlformats.org/markup-compatibility/2006" xmlns:a14="http://schemas.microsoft.com/office/drawing/2010/main">
+        <mc:Choice Requires="a14">
           <p:sp>
             <p:nvSpPr>
               <p:cNvPr id="3" name="Inhaltsplatzhalter 2">
@@ -11012,7 +11012,7 @@
             </p:txBody>
           </p:sp>
         </mc:Choice>
-        <mc:Fallback>
+        <mc:Fallback xmlns="">
           <p:sp>
             <p:nvSpPr>
               <p:cNvPr id="3" name="Inhaltsplatzhalter 2">
@@ -11239,8 +11239,8 @@
           </a:p>
         </p:txBody>
       </p:sp>
-      <mc:AlternateContent xmlns:mc="http://schemas.openxmlformats.org/markup-compatibility/2006">
-        <mc:Choice xmlns:a14="http://schemas.microsoft.com/office/drawing/2010/main" Requires="a14">
+      <mc:AlternateContent xmlns:mc="http://schemas.openxmlformats.org/markup-compatibility/2006" xmlns:a14="http://schemas.microsoft.com/office/drawing/2010/main">
+        <mc:Choice Requires="a14">
           <p:sp>
             <p:nvSpPr>
               <p:cNvPr id="2" name="Inhaltsplatzhalter 2">
@@ -11577,7 +11577,7 @@
             </p:txBody>
           </p:sp>
         </mc:Choice>
-        <mc:Fallback>
+        <mc:Fallback xmlns="">
           <p:sp>
             <p:nvSpPr>
               <p:cNvPr id="2" name="Inhaltsplatzhalter 2">
@@ -16438,34 +16438,39 @@
           </a:lstStyle>
           <a:p>
             <a:r>
-              <a:rPr lang="de-DE" sz="1800">
+              <a:rPr lang="de-DE" sz="1800" dirty="0">
                 <a:latin typeface="Times New Roman" panose="02020603050405020304" pitchFamily="18" charset="0"/>
                 <a:cs typeface="Times New Roman" panose="02020603050405020304" pitchFamily="18" charset="0"/>
               </a:rPr>
-              <a:t>Vollumfassende Betrachtung des Systems durch Zerlegung in kleinste Komponenten.</a:t>
-            </a:r>
-          </a:p>
-          <a:p>
-            <a:r>
-              <a:rPr lang="de-DE" sz="1800">
+              <a:t>Modellierung von zufälligen Zustandsänderungen ist einfach (GBM-Modellierung).</a:t>
+            </a:r>
+          </a:p>
+          <a:p>
+            <a:r>
+              <a:rPr lang="de-DE" sz="1800" dirty="0">
                 <a:latin typeface="Times New Roman" panose="02020603050405020304" pitchFamily="18" charset="0"/>
                 <a:cs typeface="Times New Roman" panose="02020603050405020304" pitchFamily="18" charset="0"/>
               </a:rPr>
-              <a:t>ISO-Regelwerke beschreiben FMEA.</a:t>
-            </a:r>
-          </a:p>
-          <a:p>
-            <a:r>
-              <a:rPr lang="de-DE" sz="1800">
+              <a:t>Leichte Modellierung von stochastischen Netzen.</a:t>
+            </a:r>
+          </a:p>
+          <a:p>
+            <a:r>
+              <a:rPr lang="de-DE" sz="1800" dirty="0">
                 <a:latin typeface="Times New Roman" panose="02020603050405020304" pitchFamily="18" charset="0"/>
                 <a:cs typeface="Times New Roman" panose="02020603050405020304" pitchFamily="18" charset="0"/>
               </a:rPr>
-              <a:t>Klare Formalisierung mithilfe von "Worksheets."</a:t>
-            </a:r>
-            <a:endParaRPr lang="de-DE" sz="1800" dirty="0">
-              <a:latin typeface="Times New Roman" panose="02020603050405020304" pitchFamily="18" charset="0"/>
-              <a:cs typeface="Times New Roman" panose="02020603050405020304" pitchFamily="18" charset="0"/>
-            </a:endParaRPr>
+              <a:t>Verständliches Grundprinzip von Markov-Ketten, leicht kommunizierbar.</a:t>
+            </a:r>
+          </a:p>
+          <a:p>
+            <a:r>
+              <a:rPr lang="de-DE" sz="1800" dirty="0">
+                <a:latin typeface="Times New Roman" panose="02020603050405020304" pitchFamily="18" charset="0"/>
+                <a:cs typeface="Times New Roman" panose="02020603050405020304" pitchFamily="18" charset="0"/>
+              </a:rPr>
+              <a:t>Effiziente Algorithmen, besonders mit stochastischen IT-Werkzeugen.</a:t>
+            </a:r>
           </a:p>
         </p:txBody>
       </p:sp>
@@ -16869,7 +16874,7 @@
                 <a:latin typeface="Times New Roman" panose="02020603050405020304" pitchFamily="18" charset="0"/>
                 <a:cs typeface="Times New Roman" panose="02020603050405020304" pitchFamily="18" charset="0"/>
               </a:rPr>
-              <a:t>Mathematische Herausforderungen bei der Multiplikation ordinal skalierter Merkmale.</a:t>
+              <a:t>Hohe Rechenkomplexität.</a:t>
             </a:r>
           </a:p>
           <a:p>
@@ -16878,7 +16883,7 @@
                 <a:latin typeface="Times New Roman" panose="02020603050405020304" pitchFamily="18" charset="0"/>
                 <a:cs typeface="Times New Roman" panose="02020603050405020304" pitchFamily="18" charset="0"/>
               </a:rPr>
-              <a:t>Begrenzte Bewertungsmöglichkeiten für bestimmte Risiken.</a:t>
+              <a:t>Erfordert umfangreiche mathematische/stochastische Fachkenntnisse.</a:t>
             </a:r>
           </a:p>
           <a:p>
@@ -16887,25 +16892,7 @@
                 <a:latin typeface="Times New Roman" panose="02020603050405020304" pitchFamily="18" charset="0"/>
                 <a:cs typeface="Times New Roman" panose="02020603050405020304" pitchFamily="18" charset="0"/>
               </a:rPr>
-              <a:t>Zeit- und Ressourcenverbrauch.</a:t>
-            </a:r>
-          </a:p>
-          <a:p>
-            <a:r>
-              <a:rPr lang="de-DE" sz="1800" dirty="0">
-                <a:latin typeface="Times New Roman" panose="02020603050405020304" pitchFamily="18" charset="0"/>
-                <a:cs typeface="Times New Roman" panose="02020603050405020304" pitchFamily="18" charset="0"/>
-              </a:rPr>
-              <a:t>Großer Datenbedarf und Systemkenntnisse erforderlich.</a:t>
-            </a:r>
-          </a:p>
-          <a:p>
-            <a:r>
-              <a:rPr lang="de-DE" sz="1800" dirty="0">
-                <a:latin typeface="Times New Roman" panose="02020603050405020304" pitchFamily="18" charset="0"/>
-                <a:cs typeface="Times New Roman" panose="02020603050405020304" pitchFamily="18" charset="0"/>
-              </a:rPr>
-              <a:t>Interdependenzen können in der ursprünglichen FMEA nicht analysiert werden.</a:t>
+              <a:t>Begrenzte Fähigkeit, extreme Stressszenarien praktisch mit einem Random Walk abzubilden.</a:t>
             </a:r>
           </a:p>
         </p:txBody>

</xml_diff>